<commit_message>
materials added to course agenda
</commit_message>
<xml_diff>
--- a/slides/cds431_week3_2.pptx
+++ b/slides/cds431_week3_2.pptx
@@ -1163,12 +1163,12 @@
         </a:fontRef>
       </dsp:style>
       <dsp:txBody>
-        <a:bodyPr spcFirstLastPara="0" vert="horz" wrap="square" lIns="184912" tIns="184912" rIns="184912" bIns="184912" numCol="1" spcCol="1270" anchor="ctr" anchorCtr="0">
+        <a:bodyPr spcFirstLastPara="0" vert="horz" wrap="square" lIns="177800" tIns="177800" rIns="177800" bIns="177800" numCol="1" spcCol="1270" anchor="ctr" anchorCtr="0">
           <a:noAutofit/>
         </a:bodyPr>
         <a:lstStyle/>
         <a:p>
-          <a:pPr marL="0" lvl="0" indent="0" algn="ctr" defTabSz="1155700">
+          <a:pPr marL="0" lvl="0" indent="0" algn="ctr" defTabSz="1111250">
             <a:lnSpc>
               <a:spcPct val="90000"/>
             </a:lnSpc>
@@ -1181,11 +1181,11 @@
             <a:buNone/>
           </a:pPr>
           <a:r>
-            <a:rPr lang="en-US" sz="2600" kern="1200" dirty="0"/>
+            <a:rPr lang="en-US" sz="2500" kern="1200" dirty="0"/>
             <a:t>3.  </a:t>
           </a:r>
           <a:r>
-            <a:rPr lang="en-US" sz="2600" b="1" kern="1200" dirty="0">
+            <a:rPr lang="en-US" sz="2500" b="1" kern="1200" dirty="0">
               <a:solidFill>
                 <a:srgbClr val="FF0000"/>
               </a:solidFill>
@@ -1270,12 +1270,12 @@
         </a:fontRef>
       </dsp:style>
       <dsp:txBody>
-        <a:bodyPr spcFirstLastPara="0" vert="horz" wrap="square" lIns="184912" tIns="184912" rIns="184912" bIns="184912" numCol="1" spcCol="1270" anchor="ctr" anchorCtr="0">
+        <a:bodyPr spcFirstLastPara="0" vert="horz" wrap="square" lIns="177800" tIns="177800" rIns="177800" bIns="177800" numCol="1" spcCol="1270" anchor="ctr" anchorCtr="0">
           <a:noAutofit/>
         </a:bodyPr>
         <a:lstStyle/>
         <a:p>
-          <a:pPr marL="0" lvl="0" indent="0" algn="ctr" defTabSz="1155700">
+          <a:pPr marL="0" lvl="0" indent="0" algn="ctr" defTabSz="1111250">
             <a:lnSpc>
               <a:spcPct val="90000"/>
             </a:lnSpc>
@@ -1288,14 +1288,14 @@
             <a:buNone/>
           </a:pPr>
           <a:r>
-            <a:rPr lang="en-US" sz="2600" kern="1200" dirty="0"/>
+            <a:rPr lang="en-US" sz="2500" kern="1200" dirty="0"/>
             <a:t>2.  Designing</a:t>
           </a:r>
           <a:r>
-            <a:rPr lang="en-US" sz="2600" kern="1200" baseline="0" dirty="0"/>
+            <a:rPr lang="en-US" sz="2500" kern="1200" baseline="0" dirty="0"/>
             <a:t> and Administering the Assessment Protocol</a:t>
           </a:r>
-          <a:endParaRPr lang="en-US" sz="2600" kern="1200" dirty="0"/>
+          <a:endParaRPr lang="en-US" sz="2500" kern="1200" dirty="0"/>
         </a:p>
       </dsp:txBody>
       <dsp:txXfrm rot="10800000">
@@ -1374,12 +1374,12 @@
         </a:fontRef>
       </dsp:style>
       <dsp:txBody>
-        <a:bodyPr spcFirstLastPara="0" vert="horz" wrap="square" lIns="184912" tIns="184912" rIns="184912" bIns="184912" numCol="1" spcCol="1270" anchor="ctr" anchorCtr="0">
+        <a:bodyPr spcFirstLastPara="0" vert="horz" wrap="square" lIns="177800" tIns="177800" rIns="177800" bIns="177800" numCol="1" spcCol="1270" anchor="ctr" anchorCtr="0">
           <a:noAutofit/>
         </a:bodyPr>
         <a:lstStyle/>
         <a:p>
-          <a:pPr marL="0" lvl="0" indent="0" algn="ctr" defTabSz="1155700">
+          <a:pPr marL="0" lvl="0" indent="0" algn="ctr" defTabSz="1111250">
             <a:lnSpc>
               <a:spcPct val="90000"/>
             </a:lnSpc>
@@ -1392,11 +1392,11 @@
             <a:buNone/>
           </a:pPr>
           <a:r>
-            <a:rPr lang="en-US" sz="2600" kern="1200" dirty="0"/>
+            <a:rPr lang="en-US" sz="2500" kern="1200" dirty="0"/>
             <a:t>1.  </a:t>
           </a:r>
           <a:r>
-            <a:rPr lang="en-US" sz="2600" b="0" kern="1200" dirty="0">
+            <a:rPr lang="en-US" sz="2500" b="0" kern="1200" dirty="0">
               <a:solidFill>
                 <a:schemeClr val="bg1"/>
               </a:solidFill>
@@ -2883,7 +2883,7 @@
           <a:p>
             <a:fld id="{C22B0A3F-E2F6-9D4C-AD6C-C2E43FD465E2}" type="datetimeFigureOut">
               <a:rPr lang="en-US" smtClean="0"/>
-              <a:t>1/11/22</a:t>
+              <a:t>1/12/22</a:t>
             </a:fld>
             <a:endParaRPr lang="en-US"/>
           </a:p>
@@ -3636,7 +3636,7 @@
           <a:p>
             <a:fld id="{DC1A57CB-4E98-3446-826D-F89B08FA47A8}" type="datetimeFigureOut">
               <a:rPr lang="en-US" smtClean="0"/>
-              <a:t>1/11/22</a:t>
+              <a:t>1/12/22</a:t>
             </a:fld>
             <a:endParaRPr lang="en-US"/>
           </a:p>
@@ -3834,7 +3834,7 @@
           <a:p>
             <a:fld id="{DC1A57CB-4E98-3446-826D-F89B08FA47A8}" type="datetimeFigureOut">
               <a:rPr lang="en-US" smtClean="0"/>
-              <a:t>1/11/22</a:t>
+              <a:t>1/12/22</a:t>
             </a:fld>
             <a:endParaRPr lang="en-US"/>
           </a:p>
@@ -4042,7 +4042,7 @@
           <a:p>
             <a:fld id="{DC1A57CB-4E98-3446-826D-F89B08FA47A8}" type="datetimeFigureOut">
               <a:rPr lang="en-US" smtClean="0"/>
-              <a:t>1/11/22</a:t>
+              <a:t>1/12/22</a:t>
             </a:fld>
             <a:endParaRPr lang="en-US"/>
           </a:p>
@@ -4240,7 +4240,7 @@
           <a:p>
             <a:fld id="{DC1A57CB-4E98-3446-826D-F89B08FA47A8}" type="datetimeFigureOut">
               <a:rPr lang="en-US" smtClean="0"/>
-              <a:t>1/11/22</a:t>
+              <a:t>1/12/22</a:t>
             </a:fld>
             <a:endParaRPr lang="en-US"/>
           </a:p>
@@ -4515,7 +4515,7 @@
           <a:p>
             <a:fld id="{DC1A57CB-4E98-3446-826D-F89B08FA47A8}" type="datetimeFigureOut">
               <a:rPr lang="en-US" smtClean="0"/>
-              <a:t>1/11/22</a:t>
+              <a:t>1/12/22</a:t>
             </a:fld>
             <a:endParaRPr lang="en-US"/>
           </a:p>
@@ -4780,7 +4780,7 @@
           <a:p>
             <a:fld id="{DC1A57CB-4E98-3446-826D-F89B08FA47A8}" type="datetimeFigureOut">
               <a:rPr lang="en-US" smtClean="0"/>
-              <a:t>1/11/22</a:t>
+              <a:t>1/12/22</a:t>
             </a:fld>
             <a:endParaRPr lang="en-US"/>
           </a:p>
@@ -5192,7 +5192,7 @@
           <a:p>
             <a:fld id="{DC1A57CB-4E98-3446-826D-F89B08FA47A8}" type="datetimeFigureOut">
               <a:rPr lang="en-US" smtClean="0"/>
-              <a:t>1/11/22</a:t>
+              <a:t>1/12/22</a:t>
             </a:fld>
             <a:endParaRPr lang="en-US"/>
           </a:p>
@@ -5333,7 +5333,7 @@
           <a:p>
             <a:fld id="{DC1A57CB-4E98-3446-826D-F89B08FA47A8}" type="datetimeFigureOut">
               <a:rPr lang="en-US" smtClean="0"/>
-              <a:t>1/11/22</a:t>
+              <a:t>1/12/22</a:t>
             </a:fld>
             <a:endParaRPr lang="en-US"/>
           </a:p>
@@ -5446,7 +5446,7 @@
           <a:p>
             <a:fld id="{DC1A57CB-4E98-3446-826D-F89B08FA47A8}" type="datetimeFigureOut">
               <a:rPr lang="en-US" smtClean="0"/>
-              <a:t>1/11/22</a:t>
+              <a:t>1/12/22</a:t>
             </a:fld>
             <a:endParaRPr lang="en-US"/>
           </a:p>
@@ -5757,7 +5757,7 @@
           <a:p>
             <a:fld id="{DC1A57CB-4E98-3446-826D-F89B08FA47A8}" type="datetimeFigureOut">
               <a:rPr lang="en-US" smtClean="0"/>
-              <a:t>1/11/22</a:t>
+              <a:t>1/12/22</a:t>
             </a:fld>
             <a:endParaRPr lang="en-US"/>
           </a:p>
@@ -6045,7 +6045,7 @@
           <a:p>
             <a:fld id="{DC1A57CB-4E98-3446-826D-F89B08FA47A8}" type="datetimeFigureOut">
               <a:rPr lang="en-US" smtClean="0"/>
-              <a:t>1/11/22</a:t>
+              <a:t>1/12/22</a:t>
             </a:fld>
             <a:endParaRPr lang="en-US"/>
           </a:p>
@@ -6316,7 +6316,7 @@
           <a:p>
             <a:fld id="{DC1A57CB-4E98-3446-826D-F89B08FA47A8}" type="datetimeFigureOut">
               <a:rPr lang="en-US" smtClean="0"/>
-              <a:t>1/11/22</a:t>
+              <a:t>1/12/22</a:t>
             </a:fld>
             <a:endParaRPr lang="en-US"/>
           </a:p>
@@ -7407,7 +7407,7 @@
         </p:nvGraphicFramePr>
         <p:xfrm>
           <a:off x="1680755" y="965926"/>
-          <a:ext cx="8669193" cy="5573649"/>
+          <a:ext cx="8669193" cy="5712618"/>
         </p:xfrm>
         <a:graphic>
           <a:graphicData uri="http://schemas.openxmlformats.org/drawingml/2006/table">
@@ -7833,55 +7833,6 @@
           </a:graphicData>
         </a:graphic>
       </p:graphicFrame>
-      <p:sp>
-        <p:nvSpPr>
-          <p:cNvPr id="4" name="Oval 3">
-            <a:extLst>
-              <a:ext uri="{FF2B5EF4-FFF2-40B4-BE49-F238E27FC236}">
-                <a16:creationId xmlns:a16="http://schemas.microsoft.com/office/drawing/2014/main" id="{E34299B2-16E5-EF4E-AF12-AE328EB916A9}"/>
-              </a:ext>
-            </a:extLst>
-          </p:cNvPr>
-          <p:cNvSpPr/>
-          <p:nvPr/>
-        </p:nvSpPr>
-        <p:spPr>
-          <a:xfrm>
-            <a:off x="1755494" y="208345"/>
-            <a:ext cx="486136" cy="472693"/>
-          </a:xfrm>
-          <a:prstGeom prst="ellipse">
-            <a:avLst/>
-          </a:prstGeom>
-          <a:solidFill>
-            <a:srgbClr val="00B050"/>
-          </a:solidFill>
-        </p:spPr>
-        <p:style>
-          <a:lnRef idx="2">
-            <a:schemeClr val="accent1">
-              <a:shade val="50000"/>
-            </a:schemeClr>
-          </a:lnRef>
-          <a:fillRef idx="1">
-            <a:schemeClr val="accent1"/>
-          </a:fillRef>
-          <a:effectRef idx="0">
-            <a:schemeClr val="accent1"/>
-          </a:effectRef>
-          <a:fontRef idx="minor">
-            <a:schemeClr val="lt1"/>
-          </a:fontRef>
-        </p:style>
-        <p:txBody>
-          <a:bodyPr rtlCol="0" anchor="ctr"/>
-          <a:lstStyle/>
-          <a:p>
-            <a:pPr algn="ctr"/>
-            <a:endParaRPr lang="en-US"/>
-          </a:p>
-        </p:txBody>
-      </p:sp>
     </p:spTree>
     <p:extLst>
       <p:ext uri="{BB962C8B-B14F-4D97-AF65-F5344CB8AC3E}">
@@ -8254,8 +8205,8 @@
         </p:nvSpPr>
         <p:spPr>
           <a:xfrm>
-            <a:off x="2152650" y="153092"/>
-            <a:ext cx="7886700" cy="1325563"/>
+            <a:off x="1524000" y="153092"/>
+            <a:ext cx="9231630" cy="1325563"/>
           </a:xfrm>
           <a:solidFill>
             <a:schemeClr val="bg2">

</xml_diff>